<commit_message>
Delete implementation branch creation and implementation.
</commit_message>
<xml_diff>
--- a/doc/TDD Workshop - TDD In Practice with AngularJS - Hands-on.pptx
+++ b/doc/TDD Workshop - TDD In Practice with AngularJS - Hands-on.pptx
@@ -12,11 +12,15 @@
     <p:sldId id="261" r:id="rId6"/>
     <p:sldId id="264" r:id="rId7"/>
     <p:sldId id="262" r:id="rId8"/>
-    <p:sldId id="265" r:id="rId9"/>
-    <p:sldId id="267" r:id="rId10"/>
-    <p:sldId id="258" r:id="rId11"/>
-    <p:sldId id="266" r:id="rId12"/>
-    <p:sldId id="260" r:id="rId13"/>
+    <p:sldId id="268" r:id="rId9"/>
+    <p:sldId id="269" r:id="rId10"/>
+    <p:sldId id="270" r:id="rId11"/>
+    <p:sldId id="271" r:id="rId12"/>
+    <p:sldId id="265" r:id="rId13"/>
+    <p:sldId id="267" r:id="rId14"/>
+    <p:sldId id="258" r:id="rId15"/>
+    <p:sldId id="266" r:id="rId16"/>
+    <p:sldId id="260" r:id="rId17"/>
   </p:sldIdLst>
   <p:sldSz cx="12192000" cy="6858000"/>
   <p:notesSz cx="6858000" cy="9144000"/>
@@ -218,7 +222,7 @@
           <a:effectLst/>
           <a:extLst>
             <a:ext uri="{91240B29-F687-4f45-9708-019B960494DF}">
-              <a14:hiddenLine xmlns="" xmlns:a14="http://schemas.microsoft.com/office/drawing/2010/main" w="9525">
+              <a14:hiddenLine xmlns:a14="http://schemas.microsoft.com/office/drawing/2010/main" xmlns="" w="9525">
                 <a:solidFill>
                   <a:srgbClr val="000000"/>
                 </a:solidFill>
@@ -1728,7 +1732,7 @@
           <a:ln/>
           <a:extLst>
             <a:ext uri="{91240B29-F687-4f45-9708-019B960494DF}">
-              <a14:hiddenLine xmlns="" xmlns:a14="http://schemas.microsoft.com/office/drawing/2010/main" w="9525">
+              <a14:hiddenLine xmlns:a14="http://schemas.microsoft.com/office/drawing/2010/main" xmlns="" w="9525">
                 <a:solidFill>
                   <a:srgbClr val="000000"/>
                 </a:solidFill>
@@ -2000,7 +2004,7 @@
           <a:ln/>
           <a:extLst>
             <a:ext uri="{91240B29-F687-4f45-9708-019B960494DF}">
-              <a14:hiddenLine xmlns="" xmlns:a14="http://schemas.microsoft.com/office/drawing/2010/main" w="9525">
+              <a14:hiddenLine xmlns:a14="http://schemas.microsoft.com/office/drawing/2010/main" xmlns="" w="9525">
                 <a:solidFill>
                   <a:srgbClr val="000000"/>
                 </a:solidFill>
@@ -2280,7 +2284,7 @@
           <a:ln/>
           <a:extLst>
             <a:ext uri="{91240B29-F687-4f45-9708-019B960494DF}">
-              <a14:hiddenLine xmlns="" xmlns:a14="http://schemas.microsoft.com/office/drawing/2010/main" w="9525">
+              <a14:hiddenLine xmlns:a14="http://schemas.microsoft.com/office/drawing/2010/main" xmlns="" w="9525">
                 <a:solidFill>
                   <a:srgbClr val="000000"/>
                 </a:solidFill>
@@ -2900,7 +2904,7 @@
           <a:ln/>
           <a:extLst>
             <a:ext uri="{91240B29-F687-4f45-9708-019B960494DF}">
-              <a14:hiddenLine xmlns="" xmlns:a14="http://schemas.microsoft.com/office/drawing/2010/main" w="9525">
+              <a14:hiddenLine xmlns:a14="http://schemas.microsoft.com/office/drawing/2010/main" xmlns="" w="9525">
                 <a:solidFill>
                   <a:srgbClr val="000000"/>
                 </a:solidFill>
@@ -3236,7 +3240,7 @@
           <a:ln/>
           <a:extLst>
             <a:ext uri="{91240B29-F687-4f45-9708-019B960494DF}">
-              <a14:hiddenLine xmlns="" xmlns:a14="http://schemas.microsoft.com/office/drawing/2010/main" w="9525">
+              <a14:hiddenLine xmlns:a14="http://schemas.microsoft.com/office/drawing/2010/main" xmlns="" w="9525">
                 <a:solidFill>
                   <a:srgbClr val="000000"/>
                 </a:solidFill>
@@ -3710,7 +3714,7 @@
           <a:ln/>
           <a:extLst>
             <a:ext uri="{91240B29-F687-4f45-9708-019B960494DF}">
-              <a14:hiddenLine xmlns="" xmlns:a14="http://schemas.microsoft.com/office/drawing/2010/main" w="9525">
+              <a14:hiddenLine xmlns:a14="http://schemas.microsoft.com/office/drawing/2010/main" xmlns="" w="9525">
                 <a:solidFill>
                   <a:srgbClr val="000000"/>
                 </a:solidFill>
@@ -4133,7 +4137,7 @@
           <a:ln/>
           <a:extLst>
             <a:ext uri="{91240B29-F687-4f45-9708-019B960494DF}">
-              <a14:hiddenLine xmlns="" xmlns:a14="http://schemas.microsoft.com/office/drawing/2010/main" w="9525">
+              <a14:hiddenLine xmlns:a14="http://schemas.microsoft.com/office/drawing/2010/main" xmlns="" w="9525">
                 <a:solidFill>
                   <a:srgbClr val="000000"/>
                 </a:solidFill>
@@ -5455,6 +5459,471 @@
           <a:lstStyle/>
           <a:p>
             <a:r>
+              <a:rPr lang="en-US" dirty="0" smtClean="0">
+                <a:solidFill>
+                  <a:schemeClr val="tx1"/>
+                </a:solidFill>
+              </a:rPr>
+              <a:t>Red</a:t>
+            </a:r>
+            <a:r>
+              <a:rPr lang="en-US" dirty="0" smtClean="0"/>
+              <a:t>/</a:t>
+            </a:r>
+            <a:r>
+              <a:rPr lang="en-US" dirty="0" smtClean="0">
+                <a:solidFill>
+                  <a:schemeClr val="tx1"/>
+                </a:solidFill>
+              </a:rPr>
+              <a:t>Green</a:t>
+            </a:r>
+            <a:r>
+              <a:rPr lang="en-US" dirty="0" smtClean="0"/>
+              <a:t>/</a:t>
+            </a:r>
+            <a:r>
+              <a:rPr lang="en-US" dirty="0" smtClean="0">
+                <a:solidFill>
+                  <a:srgbClr val="0070C0"/>
+                </a:solidFill>
+              </a:rPr>
+              <a:t>Refactor</a:t>
+            </a:r>
+            <a:endParaRPr lang="en-US" dirty="0">
+              <a:solidFill>
+                <a:srgbClr val="0070C0"/>
+              </a:solidFill>
+            </a:endParaRPr>
+          </a:p>
+        </p:txBody>
+      </p:sp>
+      <p:sp>
+        <p:nvSpPr>
+          <p:cNvPr id="2" name="Content Placeholder 1"/>
+          <p:cNvSpPr>
+            <a:spLocks noGrp="1"/>
+          </p:cNvSpPr>
+          <p:nvPr>
+            <p:ph idx="1"/>
+          </p:nvPr>
+        </p:nvSpPr>
+        <p:spPr>
+          <a:xfrm>
+            <a:off x="818712" y="2222287"/>
+            <a:ext cx="10554574" cy="4570399"/>
+          </a:xfrm>
+        </p:spPr>
+        <p:txBody>
+          <a:bodyPr>
+            <a:normAutofit/>
+          </a:bodyPr>
+          <a:lstStyle/>
+          <a:p>
+            <a:r>
+              <a:rPr lang="en-US" dirty="0" smtClean="0"/>
+              <a:t>You can now safely change the code. Look for code smells or other improvements and repeat the cycle until finished.</a:t>
+            </a:r>
+          </a:p>
+        </p:txBody>
+      </p:sp>
+    </p:spTree>
+    <p:extLst>
+      <p:ext uri="{BB962C8B-B14F-4D97-AF65-F5344CB8AC3E}">
+        <p14:creationId xmlns:p14="http://schemas.microsoft.com/office/powerpoint/2010/main" val="3330866362"/>
+      </p:ext>
+    </p:extLst>
+  </p:cSld>
+  <p:clrMapOvr>
+    <a:masterClrMapping/>
+  </p:clrMapOvr>
+  <p:timing>
+    <p:tnLst>
+      <p:par>
+        <p:cTn id="1" dur="indefinite" restart="never" nodeType="tmRoot"/>
+      </p:par>
+    </p:tnLst>
+  </p:timing>
+</p:sld>
+</file>
+
+<file path=ppt/slides/slide11.xml><?xml version="1.0" encoding="utf-8"?>
+<p:sld xmlns:a="http://schemas.openxmlformats.org/drawingml/2006/main" xmlns:r="http://schemas.openxmlformats.org/officeDocument/2006/relationships" xmlns:p="http://schemas.openxmlformats.org/presentationml/2006/main">
+  <p:cSld>
+    <p:spTree>
+      <p:nvGrpSpPr>
+        <p:cNvPr id="1" name=""/>
+        <p:cNvGrpSpPr/>
+        <p:nvPr/>
+      </p:nvGrpSpPr>
+      <p:grpSpPr>
+        <a:xfrm>
+          <a:off x="0" y="0"/>
+          <a:ext cx="0" cy="0"/>
+          <a:chOff x="0" y="0"/>
+          <a:chExt cx="0" cy="0"/>
+        </a:xfrm>
+      </p:grpSpPr>
+      <p:sp>
+        <p:nvSpPr>
+          <p:cNvPr id="4" name="Title 3"/>
+          <p:cNvSpPr>
+            <a:spLocks noGrp="1"/>
+          </p:cNvSpPr>
+          <p:nvPr>
+            <p:ph type="title"/>
+          </p:nvPr>
+        </p:nvSpPr>
+        <p:spPr/>
+        <p:txBody>
+          <a:bodyPr/>
+          <a:lstStyle/>
+          <a:p>
+            <a:r>
+              <a:rPr lang="en-US" dirty="0" smtClean="0"/>
+              <a:t>Next steps…</a:t>
+            </a:r>
+            <a:endParaRPr lang="en-US" dirty="0"/>
+          </a:p>
+        </p:txBody>
+      </p:sp>
+      <p:sp>
+        <p:nvSpPr>
+          <p:cNvPr id="2" name="Content Placeholder 1"/>
+          <p:cNvSpPr>
+            <a:spLocks noGrp="1"/>
+          </p:cNvSpPr>
+          <p:nvPr>
+            <p:ph idx="1"/>
+          </p:nvPr>
+        </p:nvSpPr>
+        <p:spPr>
+          <a:xfrm>
+            <a:off x="818712" y="2222287"/>
+            <a:ext cx="10554574" cy="4570399"/>
+          </a:xfrm>
+        </p:spPr>
+        <p:txBody>
+          <a:bodyPr>
+            <a:normAutofit/>
+          </a:bodyPr>
+          <a:lstStyle/>
+          <a:p>
+            <a:r>
+              <a:rPr lang="en-US" dirty="0" smtClean="0"/>
+              <a:t>Consider various inputs and error conditions. Add additional tests.</a:t>
+            </a:r>
+          </a:p>
+          <a:p>
+            <a:r>
+              <a:rPr lang="en-US" dirty="0" smtClean="0"/>
+              <a:t>Implement the “</a:t>
+            </a:r>
+            <a:r>
+              <a:rPr lang="en-US" dirty="0" err="1" smtClean="0"/>
+              <a:t>deletePost</a:t>
+            </a:r>
+            <a:r>
+              <a:rPr lang="en-US" dirty="0" smtClean="0"/>
+              <a:t>” method in /app/posts/post.directive.js</a:t>
+            </a:r>
+          </a:p>
+          <a:p>
+            <a:r>
+              <a:rPr lang="en-US" dirty="0" smtClean="0"/>
+              <a:t>Add an ng-click </a:t>
+            </a:r>
+            <a:r>
+              <a:rPr lang="en-US" dirty="0" err="1" smtClean="0"/>
+              <a:t>hanlder</a:t>
+            </a:r>
+            <a:r>
+              <a:rPr lang="en-US" dirty="0" smtClean="0"/>
+              <a:t> in the post view.</a:t>
+            </a:r>
+          </a:p>
+          <a:p>
+            <a:r>
+              <a:rPr lang="en-US" dirty="0" smtClean="0"/>
+              <a:t>Add an event handler to the feed</a:t>
+            </a:r>
+            <a:endParaRPr lang="en-US" dirty="0" smtClean="0"/>
+          </a:p>
+        </p:txBody>
+      </p:sp>
+    </p:spTree>
+    <p:extLst>
+      <p:ext uri="{BB962C8B-B14F-4D97-AF65-F5344CB8AC3E}">
+        <p14:creationId xmlns:p14="http://schemas.microsoft.com/office/powerpoint/2010/main" val="1217922105"/>
+      </p:ext>
+    </p:extLst>
+  </p:cSld>
+  <p:clrMapOvr>
+    <a:masterClrMapping/>
+  </p:clrMapOvr>
+  <p:timing>
+    <p:tnLst>
+      <p:par>
+        <p:cTn id="1" dur="indefinite" restart="never" nodeType="tmRoot"/>
+      </p:par>
+    </p:tnLst>
+  </p:timing>
+</p:sld>
+</file>
+
+<file path=ppt/slides/slide12.xml><?xml version="1.0" encoding="utf-8"?>
+<p:sld xmlns:a="http://schemas.openxmlformats.org/drawingml/2006/main" xmlns:r="http://schemas.openxmlformats.org/officeDocument/2006/relationships" xmlns:p="http://schemas.openxmlformats.org/presentationml/2006/main">
+  <p:cSld>
+    <p:spTree>
+      <p:nvGrpSpPr>
+        <p:cNvPr id="1" name=""/>
+        <p:cNvGrpSpPr/>
+        <p:nvPr/>
+      </p:nvGrpSpPr>
+      <p:grpSpPr>
+        <a:xfrm>
+          <a:off x="0" y="0"/>
+          <a:ext cx="0" cy="0"/>
+          <a:chOff x="0" y="0"/>
+          <a:chExt cx="0" cy="0"/>
+        </a:xfrm>
+      </p:grpSpPr>
+      <p:sp>
+        <p:nvSpPr>
+          <p:cNvPr id="4" name="Title 3"/>
+          <p:cNvSpPr>
+            <a:spLocks noGrp="1"/>
+          </p:cNvSpPr>
+          <p:nvPr>
+            <p:ph type="title"/>
+          </p:nvPr>
+        </p:nvSpPr>
+        <p:spPr/>
+        <p:txBody>
+          <a:bodyPr/>
+          <a:lstStyle/>
+          <a:p>
+            <a:r>
+              <a:rPr lang="en-US" dirty="0" smtClean="0"/>
+              <a:t>Breakout</a:t>
+            </a:r>
+            <a:endParaRPr lang="en-US" dirty="0"/>
+          </a:p>
+        </p:txBody>
+      </p:sp>
+    </p:spTree>
+    <p:extLst>
+      <p:ext uri="{BB962C8B-B14F-4D97-AF65-F5344CB8AC3E}">
+        <p14:creationId xmlns:p14="http://schemas.microsoft.com/office/powerpoint/2010/main" val="2609827390"/>
+      </p:ext>
+    </p:extLst>
+  </p:cSld>
+  <p:clrMapOvr>
+    <a:masterClrMapping/>
+  </p:clrMapOvr>
+</p:sld>
+</file>
+
+<file path=ppt/slides/slide13.xml><?xml version="1.0" encoding="utf-8"?>
+<p:sld xmlns:a="http://schemas.openxmlformats.org/drawingml/2006/main" xmlns:r="http://schemas.openxmlformats.org/officeDocument/2006/relationships" xmlns:p="http://schemas.openxmlformats.org/presentationml/2006/main">
+  <p:cSld>
+    <p:spTree>
+      <p:nvGrpSpPr>
+        <p:cNvPr id="1" name=""/>
+        <p:cNvGrpSpPr/>
+        <p:nvPr/>
+      </p:nvGrpSpPr>
+      <p:grpSpPr>
+        <a:xfrm>
+          <a:off x="0" y="0"/>
+          <a:ext cx="0" cy="0"/>
+          <a:chOff x="0" y="0"/>
+          <a:chExt cx="0" cy="0"/>
+        </a:xfrm>
+      </p:grpSpPr>
+      <p:sp>
+        <p:nvSpPr>
+          <p:cNvPr id="4" name="Title 3"/>
+          <p:cNvSpPr>
+            <a:spLocks noGrp="1"/>
+          </p:cNvSpPr>
+          <p:nvPr>
+            <p:ph type="title"/>
+          </p:nvPr>
+        </p:nvSpPr>
+        <p:spPr/>
+        <p:txBody>
+          <a:bodyPr/>
+          <a:lstStyle/>
+          <a:p>
+            <a:r>
+              <a:rPr lang="en-US" dirty="0" smtClean="0"/>
+              <a:t>Your mission…</a:t>
+            </a:r>
+            <a:endParaRPr lang="en-US" dirty="0"/>
+          </a:p>
+        </p:txBody>
+      </p:sp>
+      <p:sp>
+        <p:nvSpPr>
+          <p:cNvPr id="2" name="TextBox 1"/>
+          <p:cNvSpPr txBox="1"/>
+          <p:nvPr/>
+        </p:nvSpPr>
+        <p:spPr>
+          <a:xfrm>
+            <a:off x="1272887" y="3241963"/>
+            <a:ext cx="9646223" cy="2677656"/>
+          </a:xfrm>
+          <a:prstGeom prst="rect">
+            <a:avLst/>
+          </a:prstGeom>
+          <a:noFill/>
+        </p:spPr>
+        <p:txBody>
+          <a:bodyPr wrap="square" rtlCol="0">
+            <a:spAutoFit/>
+          </a:bodyPr>
+          <a:lstStyle/>
+          <a:p>
+            <a:r>
+              <a:rPr lang="en-US" sz="2800" dirty="0" smtClean="0"/>
+              <a:t>As a </a:t>
+            </a:r>
+            <a:r>
+              <a:rPr lang="en-US" sz="2800" dirty="0" err="1" smtClean="0"/>
+              <a:t>sheeper</a:t>
+            </a:r>
+            <a:endParaRPr lang="en-US" sz="2800" dirty="0" smtClean="0"/>
+          </a:p>
+          <a:p>
+            <a:endParaRPr lang="en-US" sz="2800" dirty="0" smtClean="0"/>
+          </a:p>
+          <a:p>
+            <a:r>
+              <a:rPr lang="en-US" sz="2800" dirty="0" smtClean="0"/>
+              <a:t>I want the ability edit </a:t>
+            </a:r>
+            <a:r>
+              <a:rPr lang="en-US" sz="2800" dirty="0" err="1" smtClean="0"/>
+              <a:t>bleets</a:t>
+            </a:r>
+            <a:endParaRPr lang="en-US" sz="2800" dirty="0" smtClean="0"/>
+          </a:p>
+          <a:p>
+            <a:endParaRPr lang="en-US" sz="2800" dirty="0" smtClean="0"/>
+          </a:p>
+          <a:p>
+            <a:r>
+              <a:rPr lang="en-US" sz="2800" dirty="0" smtClean="0"/>
+              <a:t>So that I can change the texts of </a:t>
+            </a:r>
+            <a:r>
+              <a:rPr lang="en-US" sz="2800" dirty="0" err="1" smtClean="0"/>
+              <a:t>bleets</a:t>
+            </a:r>
+            <a:r>
+              <a:rPr lang="en-US" sz="2800" dirty="0" smtClean="0"/>
+              <a:t> when I make mistakes and stuff.</a:t>
+            </a:r>
+            <a:endParaRPr lang="en-US" sz="2800" dirty="0"/>
+          </a:p>
+        </p:txBody>
+      </p:sp>
+      <p:pic>
+        <p:nvPicPr>
+          <p:cNvPr id="6" name="Picture 2" descr="http://www.bleatinghq.com/images/bleat-logo.png"/>
+          <p:cNvPicPr>
+            <a:picLocks noChangeAspect="1" noChangeArrowheads="1"/>
+          </p:cNvPicPr>
+          <p:nvPr/>
+        </p:nvPicPr>
+        <p:blipFill>
+          <a:blip r:embed="rId2">
+            <a:extLst>
+              <a:ext uri="{28A0092B-C50C-407E-A947-70E740481C1C}">
+                <a14:useLocalDpi xmlns:a14="http://schemas.microsoft.com/office/drawing/2010/main" val="0"/>
+              </a:ext>
+            </a:extLst>
+          </a:blip>
+          <a:srcRect/>
+          <a:stretch>
+            <a:fillRect/>
+          </a:stretch>
+        </p:blipFill>
+        <p:spPr bwMode="auto">
+          <a:xfrm>
+            <a:off x="2563775" y="6112786"/>
+            <a:ext cx="3810000" cy="2971801"/>
+          </a:xfrm>
+          <a:prstGeom prst="rect">
+            <a:avLst/>
+          </a:prstGeom>
+          <a:noFill/>
+          <a:extLst>
+            <a:ext uri="{909E8E84-426E-40DD-AFC4-6F175D3DCCD1}">
+              <a14:hiddenFill xmlns:a14="http://schemas.microsoft.com/office/drawing/2010/main">
+                <a:solidFill>
+                  <a:srgbClr val="FFFFFF"/>
+                </a:solidFill>
+              </a14:hiddenFill>
+            </a:ext>
+          </a:extLst>
+        </p:spPr>
+      </p:pic>
+    </p:spTree>
+    <p:extLst>
+      <p:ext uri="{BB962C8B-B14F-4D97-AF65-F5344CB8AC3E}">
+        <p14:creationId xmlns:p14="http://schemas.microsoft.com/office/powerpoint/2010/main" val="2494607478"/>
+      </p:ext>
+    </p:extLst>
+  </p:cSld>
+  <p:clrMapOvr>
+    <a:masterClrMapping/>
+  </p:clrMapOvr>
+  <p:timing>
+    <p:tnLst>
+      <p:par>
+        <p:cTn id="1" dur="indefinite" restart="never" nodeType="tmRoot"/>
+      </p:par>
+    </p:tnLst>
+  </p:timing>
+</p:sld>
+</file>
+
+<file path=ppt/slides/slide14.xml><?xml version="1.0" encoding="utf-8"?>
+<p:sld xmlns:a="http://schemas.openxmlformats.org/drawingml/2006/main" xmlns:r="http://schemas.openxmlformats.org/officeDocument/2006/relationships" xmlns:p="http://schemas.openxmlformats.org/presentationml/2006/main">
+  <p:cSld>
+    <p:spTree>
+      <p:nvGrpSpPr>
+        <p:cNvPr id="1" name=""/>
+        <p:cNvGrpSpPr/>
+        <p:nvPr/>
+      </p:nvGrpSpPr>
+      <p:grpSpPr>
+        <a:xfrm>
+          <a:off x="0" y="0"/>
+          <a:ext cx="0" cy="0"/>
+          <a:chOff x="0" y="0"/>
+          <a:chExt cx="0" cy="0"/>
+        </a:xfrm>
+      </p:grpSpPr>
+      <p:sp>
+        <p:nvSpPr>
+          <p:cNvPr id="4" name="Title 3"/>
+          <p:cNvSpPr>
+            <a:spLocks noGrp="1"/>
+          </p:cNvSpPr>
+          <p:nvPr>
+            <p:ph type="title"/>
+          </p:nvPr>
+        </p:nvSpPr>
+        <p:spPr/>
+        <p:txBody>
+          <a:bodyPr/>
+          <a:lstStyle/>
+          <a:p>
+            <a:r>
               <a:rPr lang="en-US" dirty="0" smtClean="0"/>
               <a:t>Workstation Setup</a:t>
             </a:r>
@@ -5556,7 +6025,7 @@
 </p:sld>
 </file>
 
-<file path=ppt/slides/slide11.xml><?xml version="1.0" encoding="utf-8"?>
+<file path=ppt/slides/slide15.xml><?xml version="1.0" encoding="utf-8"?>
 <p:sld xmlns:a="http://schemas.openxmlformats.org/drawingml/2006/main" xmlns:r="http://schemas.openxmlformats.org/officeDocument/2006/relationships" xmlns:p="http://schemas.openxmlformats.org/presentationml/2006/main">
   <p:cSld>
     <p:spTree>
@@ -5657,7 +6126,7 @@
 </p:sld>
 </file>
 
-<file path=ppt/slides/slide12.xml><?xml version="1.0" encoding="utf-8"?>
+<file path=ppt/slides/slide16.xml><?xml version="1.0" encoding="utf-8"?>
 <p:sld xmlns:a="http://schemas.openxmlformats.org/drawingml/2006/main" xmlns:r="http://schemas.openxmlformats.org/officeDocument/2006/relationships" xmlns:p="http://schemas.openxmlformats.org/presentationml/2006/main">
   <p:cSld>
     <p:spTree>
@@ -5691,11 +6160,7 @@
           <a:p>
             <a:r>
               <a:rPr lang="en-US" dirty="0" smtClean="0"/>
-              <a:t>During the </a:t>
-            </a:r>
-            <a:r>
-              <a:rPr lang="en-US" dirty="0" smtClean="0"/>
-              <a:t>exercise…</a:t>
+              <a:t>During the exercise…</a:t>
             </a:r>
             <a:endParaRPr lang="en-US" dirty="0"/>
           </a:p>
@@ -6093,17 +6558,12 @@
             </a:r>
             <a:r>
               <a:rPr lang="en-US" dirty="0" err="1" smtClean="0"/>
-              <a:t>S</a:t>
-            </a:r>
-            <a:r>
-              <a:rPr lang="en-US" dirty="0" err="1" smtClean="0"/>
-              <a:t>heeper</a:t>
+              <a:t>Sheeper</a:t>
             </a:r>
             <a:r>
               <a:rPr lang="en-US" dirty="0" smtClean="0"/>
               <a:t> architecture and UX.</a:t>
             </a:r>
-            <a:endParaRPr lang="en-US" dirty="0" smtClean="0"/>
           </a:p>
           <a:p>
             <a:r>
@@ -6116,7 +6576,6 @@
               <a:rPr lang="en-US" dirty="0" smtClean="0"/>
               <a:t>Break out into two-person teams and implement another feature – edit.</a:t>
             </a:r>
-            <a:endParaRPr lang="en-US" dirty="0" smtClean="0"/>
           </a:p>
         </p:txBody>
       </p:sp>
@@ -6359,11 +6818,7 @@
             <a:pPr lvl="1"/>
             <a:r>
               <a:rPr lang="en-US" dirty="0" smtClean="0"/>
-              <a:t>User Service – Used to create, edit, delet</a:t>
-            </a:r>
-            <a:r>
-              <a:rPr lang="en-US" dirty="0" smtClean="0"/>
-              <a:t>e </a:t>
+              <a:t>User Service – Used to create, edit, delete </a:t>
             </a:r>
             <a:r>
               <a:rPr lang="en-US" dirty="0" err="1" smtClean="0"/>
@@ -6560,8 +7015,23 @@
           <a:p>
             <a:r>
               <a:rPr lang="en-US" dirty="0" smtClean="0"/>
-              <a:t>Add </a:t>
-            </a:r>
+              <a:t>Let’s start with the </a:t>
+            </a:r>
+            <a:r>
+              <a:rPr lang="en-US" dirty="0" err="1" smtClean="0"/>
+              <a:t>bleet</a:t>
+            </a:r>
+            <a:r>
+              <a:rPr lang="en-US" dirty="0" smtClean="0"/>
+              <a:t> service.</a:t>
+            </a:r>
+          </a:p>
+          <a:p>
+            <a:r>
+              <a:rPr lang="en-US" dirty="0" smtClean="0"/>
+              <a:t>We will do this by adding a test to app\data\bleets.spec.js</a:t>
+            </a:r>
+            <a:endParaRPr lang="en-US" dirty="0" smtClean="0"/>
           </a:p>
         </p:txBody>
       </p:sp>
@@ -6618,23 +7088,97 @@
           <a:lstStyle/>
           <a:p>
             <a:r>
+              <a:rPr lang="en-US" dirty="0" smtClean="0">
+                <a:solidFill>
+                  <a:schemeClr val="accent6">
+                    <a:lumMod val="75000"/>
+                  </a:schemeClr>
+                </a:solidFill>
+              </a:rPr>
+              <a:t>Red</a:t>
+            </a:r>
+            <a:r>
               <a:rPr lang="en-US" dirty="0" smtClean="0"/>
-              <a:t>Breakout</a:t>
-            </a:r>
-            <a:endParaRPr lang="en-US" dirty="0"/>
+              <a:t>/Green/Refactor</a:t>
+            </a:r>
+            <a:endParaRPr lang="en-US" dirty="0"/>
+          </a:p>
+        </p:txBody>
+      </p:sp>
+      <p:sp>
+        <p:nvSpPr>
+          <p:cNvPr id="2" name="Content Placeholder 1"/>
+          <p:cNvSpPr>
+            <a:spLocks noGrp="1"/>
+          </p:cNvSpPr>
+          <p:nvPr>
+            <p:ph idx="1"/>
+          </p:nvPr>
+        </p:nvSpPr>
+        <p:spPr>
+          <a:xfrm>
+            <a:off x="818712" y="2222287"/>
+            <a:ext cx="10554574" cy="4570399"/>
+          </a:xfrm>
+        </p:spPr>
+        <p:txBody>
+          <a:bodyPr>
+            <a:normAutofit/>
+          </a:bodyPr>
+          <a:lstStyle/>
+          <a:p>
+            <a:r>
+              <a:rPr lang="en-US" dirty="0" smtClean="0"/>
+              <a:t>We will start by making a failing test (red) that checks to see if the “</a:t>
+            </a:r>
+            <a:r>
+              <a:rPr lang="en-US" dirty="0" err="1" smtClean="0"/>
+              <a:t>deleteBleet</a:t>
+            </a:r>
+            <a:r>
+              <a:rPr lang="en-US" dirty="0" smtClean="0"/>
+              <a:t>” function calls the right endpoint.</a:t>
+            </a:r>
+          </a:p>
+          <a:p>
+            <a:r>
+              <a:rPr lang="en-US" dirty="0" smtClean="0"/>
+              <a:t>We will use $</a:t>
+            </a:r>
+            <a:r>
+              <a:rPr lang="en-US" dirty="0" err="1" smtClean="0"/>
+              <a:t>httpBackend</a:t>
+            </a:r>
+            <a:r>
+              <a:rPr lang="en-US" dirty="0" smtClean="0"/>
+              <a:t> to help us do this.</a:t>
+            </a:r>
+          </a:p>
+          <a:p>
+            <a:r>
+              <a:rPr lang="en-US" dirty="0" smtClean="0"/>
+              <a:t>You can run the test suite by running the command “gulp test”</a:t>
+            </a:r>
           </a:p>
         </p:txBody>
       </p:sp>
     </p:spTree>
     <p:extLst>
       <p:ext uri="{BB962C8B-B14F-4D97-AF65-F5344CB8AC3E}">
-        <p14:creationId xmlns:p14="http://schemas.microsoft.com/office/powerpoint/2010/main" val="2609827390"/>
+        <p14:creationId xmlns:p14="http://schemas.microsoft.com/office/powerpoint/2010/main" val="201521504"/>
       </p:ext>
     </p:extLst>
   </p:cSld>
   <p:clrMapOvr>
     <a:masterClrMapping/>
   </p:clrMapOvr>
+  <p:timing>
+    <p:tnLst>
+      <p:par>
+        <p:cTn id="1" dur="indefinite" restart="never" nodeType="tmRoot"/>
+      </p:par>
+    </p:tnLst>
+  </p:timing>
 </p:sld>
 </file>
 
@@ -6671,124 +7215,69 @@
           <a:lstStyle/>
           <a:p>
             <a:r>
+              <a:rPr lang="en-US" dirty="0" smtClean="0">
+                <a:solidFill>
+                  <a:schemeClr val="tx1"/>
+                </a:solidFill>
+              </a:rPr>
+              <a:t>Red</a:t>
+            </a:r>
+            <a:r>
               <a:rPr lang="en-US" dirty="0" smtClean="0"/>
-              <a:t>Your mission…</a:t>
-            </a:r>
-            <a:endParaRPr lang="en-US" dirty="0"/>
-          </a:p>
-        </p:txBody>
-      </p:sp>
-      <p:sp>
-        <p:nvSpPr>
-          <p:cNvPr id="2" name="TextBox 1"/>
-          <p:cNvSpPr txBox="1"/>
-          <p:nvPr/>
+              <a:t>/</a:t>
+            </a:r>
+            <a:r>
+              <a:rPr lang="en-US" dirty="0" smtClean="0">
+                <a:solidFill>
+                  <a:schemeClr val="accent3">
+                    <a:lumMod val="75000"/>
+                  </a:schemeClr>
+                </a:solidFill>
+              </a:rPr>
+              <a:t>Green</a:t>
+            </a:r>
+            <a:r>
+              <a:rPr lang="en-US" dirty="0" smtClean="0"/>
+              <a:t>/Refactor</a:t>
+            </a:r>
+            <a:endParaRPr lang="en-US" dirty="0"/>
+          </a:p>
+        </p:txBody>
+      </p:sp>
+      <p:sp>
+        <p:nvSpPr>
+          <p:cNvPr id="2" name="Content Placeholder 1"/>
+          <p:cNvSpPr>
+            <a:spLocks noGrp="1"/>
+          </p:cNvSpPr>
+          <p:nvPr>
+            <p:ph idx="1"/>
+          </p:nvPr>
         </p:nvSpPr>
         <p:spPr>
           <a:xfrm>
-            <a:off x="1272887" y="3241963"/>
-            <a:ext cx="9646223" cy="2677656"/>
+            <a:off x="818712" y="2222287"/>
+            <a:ext cx="10554574" cy="4570399"/>
           </a:xfrm>
-          <a:prstGeom prst="rect">
-            <a:avLst/>
-          </a:prstGeom>
-          <a:noFill/>
         </p:spPr>
         <p:txBody>
-          <a:bodyPr wrap="square" rtlCol="0">
-            <a:spAutoFit/>
+          <a:bodyPr>
+            <a:normAutofit/>
           </a:bodyPr>
           <a:lstStyle/>
           <a:p>
             <a:r>
-              <a:rPr lang="en-US" sz="2800" dirty="0" smtClean="0"/>
-              <a:t>As a </a:t>
-            </a:r>
-            <a:r>
-              <a:rPr lang="en-US" sz="2800" dirty="0" err="1" smtClean="0"/>
-              <a:t>sheeper</a:t>
-            </a:r>
-            <a:endParaRPr lang="en-US" sz="2800" dirty="0" smtClean="0"/>
-          </a:p>
-          <a:p>
-            <a:endParaRPr lang="en-US" sz="2800" dirty="0" smtClean="0"/>
-          </a:p>
-          <a:p>
-            <a:r>
-              <a:rPr lang="en-US" sz="2800" dirty="0" smtClean="0"/>
-              <a:t>I want the ability edit </a:t>
-            </a:r>
-            <a:r>
-              <a:rPr lang="en-US" sz="2800" dirty="0" err="1" smtClean="0"/>
-              <a:t>bleets</a:t>
-            </a:r>
-            <a:endParaRPr lang="en-US" sz="2800" dirty="0" smtClean="0"/>
-          </a:p>
-          <a:p>
-            <a:endParaRPr lang="en-US" sz="2800" dirty="0" smtClean="0"/>
-          </a:p>
-          <a:p>
-            <a:r>
-              <a:rPr lang="en-US" sz="2800" dirty="0" smtClean="0"/>
-              <a:t>So that I can change the texts of </a:t>
-            </a:r>
-            <a:r>
-              <a:rPr lang="en-US" sz="2800" dirty="0" err="1" smtClean="0"/>
-              <a:t>bleets</a:t>
-            </a:r>
-            <a:r>
-              <a:rPr lang="en-US" sz="2800" dirty="0" smtClean="0"/>
-              <a:t> when I make mistakes and stuff.</a:t>
-            </a:r>
-            <a:endParaRPr lang="en-US" sz="2800" dirty="0"/>
-          </a:p>
-        </p:txBody>
-      </p:sp>
-      <p:pic>
-        <p:nvPicPr>
-          <p:cNvPr id="6" name="Picture 2" descr="http://www.bleatinghq.com/images/bleat-logo.png"/>
-          <p:cNvPicPr>
-            <a:picLocks noChangeAspect="1" noChangeArrowheads="1"/>
-          </p:cNvPicPr>
-          <p:nvPr/>
-        </p:nvPicPr>
-        <p:blipFill>
-          <a:blip r:embed="rId2">
-            <a:extLst>
-              <a:ext uri="{28A0092B-C50C-407E-A947-70E740481C1C}">
-                <a14:useLocalDpi xmlns:a14="http://schemas.microsoft.com/office/drawing/2010/main" val="0"/>
-              </a:ext>
-            </a:extLst>
-          </a:blip>
-          <a:srcRect/>
-          <a:stretch>
-            <a:fillRect/>
-          </a:stretch>
-        </p:blipFill>
-        <p:spPr bwMode="auto">
-          <a:xfrm>
-            <a:off x="2563775" y="6112786"/>
-            <a:ext cx="3810000" cy="2971801"/>
-          </a:xfrm>
-          <a:prstGeom prst="rect">
-            <a:avLst/>
-          </a:prstGeom>
-          <a:noFill/>
-          <a:extLst>
-            <a:ext uri="{909E8E84-426E-40DD-AFC4-6F175D3DCCD1}">
-              <a14:hiddenFill xmlns:a14="http://schemas.microsoft.com/office/drawing/2010/main">
-                <a:solidFill>
-                  <a:srgbClr val="FFFFFF"/>
-                </a:solidFill>
-              </a14:hiddenFill>
-            </a:ext>
-          </a:extLst>
-        </p:spPr>
-      </p:pic>
+              <a:rPr lang="en-US" dirty="0" smtClean="0"/>
+              <a:t>Make the test pass.</a:t>
+            </a:r>
+            <a:endParaRPr lang="en-US" dirty="0" smtClean="0"/>
+          </a:p>
+        </p:txBody>
+      </p:sp>
     </p:spTree>
     <p:extLst>
       <p:ext uri="{BB962C8B-B14F-4D97-AF65-F5344CB8AC3E}">
-        <p14:creationId xmlns:p14="http://schemas.microsoft.com/office/powerpoint/2010/main" val="2494607478"/>
+        <p14:creationId xmlns:p14="http://schemas.microsoft.com/office/powerpoint/2010/main" val="1219249696"/>
       </p:ext>
     </p:extLst>
   </p:cSld>

</xml_diff>

<commit_message>
Cherry picked changes to hands-on ppt
</commit_message>
<xml_diff>
--- a/doc/TDD Workshop - TDD In Practice with AngularJS - Hands-on.pptx
+++ b/doc/TDD Workshop - TDD In Practice with AngularJS - Hands-on.pptx
@@ -12,11 +12,15 @@
     <p:sldId id="261" r:id="rId6"/>
     <p:sldId id="264" r:id="rId7"/>
     <p:sldId id="262" r:id="rId8"/>
-    <p:sldId id="265" r:id="rId9"/>
-    <p:sldId id="267" r:id="rId10"/>
-    <p:sldId id="258" r:id="rId11"/>
-    <p:sldId id="266" r:id="rId12"/>
-    <p:sldId id="260" r:id="rId13"/>
+    <p:sldId id="268" r:id="rId9"/>
+    <p:sldId id="269" r:id="rId10"/>
+    <p:sldId id="270" r:id="rId11"/>
+    <p:sldId id="271" r:id="rId12"/>
+    <p:sldId id="265" r:id="rId13"/>
+    <p:sldId id="267" r:id="rId14"/>
+    <p:sldId id="258" r:id="rId15"/>
+    <p:sldId id="266" r:id="rId16"/>
+    <p:sldId id="260" r:id="rId17"/>
   </p:sldIdLst>
   <p:sldSz cx="12192000" cy="6858000"/>
   <p:notesSz cx="6858000" cy="9144000"/>
@@ -218,7 +222,7 @@
           <a:effectLst/>
           <a:extLst>
             <a:ext uri="{91240B29-F687-4f45-9708-019B960494DF}">
-              <a14:hiddenLine xmlns="" xmlns:a14="http://schemas.microsoft.com/office/drawing/2010/main" w="9525">
+              <a14:hiddenLine xmlns:a14="http://schemas.microsoft.com/office/drawing/2010/main" xmlns="" w="9525">
                 <a:solidFill>
                   <a:srgbClr val="000000"/>
                 </a:solidFill>
@@ -1728,7 +1732,7 @@
           <a:ln/>
           <a:extLst>
             <a:ext uri="{91240B29-F687-4f45-9708-019B960494DF}">
-              <a14:hiddenLine xmlns="" xmlns:a14="http://schemas.microsoft.com/office/drawing/2010/main" w="9525">
+              <a14:hiddenLine xmlns:a14="http://schemas.microsoft.com/office/drawing/2010/main" xmlns="" w="9525">
                 <a:solidFill>
                   <a:srgbClr val="000000"/>
                 </a:solidFill>
@@ -2000,7 +2004,7 @@
           <a:ln/>
           <a:extLst>
             <a:ext uri="{91240B29-F687-4f45-9708-019B960494DF}">
-              <a14:hiddenLine xmlns="" xmlns:a14="http://schemas.microsoft.com/office/drawing/2010/main" w="9525">
+              <a14:hiddenLine xmlns:a14="http://schemas.microsoft.com/office/drawing/2010/main" xmlns="" w="9525">
                 <a:solidFill>
                   <a:srgbClr val="000000"/>
                 </a:solidFill>
@@ -2280,7 +2284,7 @@
           <a:ln/>
           <a:extLst>
             <a:ext uri="{91240B29-F687-4f45-9708-019B960494DF}">
-              <a14:hiddenLine xmlns="" xmlns:a14="http://schemas.microsoft.com/office/drawing/2010/main" w="9525">
+              <a14:hiddenLine xmlns:a14="http://schemas.microsoft.com/office/drawing/2010/main" xmlns="" w="9525">
                 <a:solidFill>
                   <a:srgbClr val="000000"/>
                 </a:solidFill>
@@ -2900,7 +2904,7 @@
           <a:ln/>
           <a:extLst>
             <a:ext uri="{91240B29-F687-4f45-9708-019B960494DF}">
-              <a14:hiddenLine xmlns="" xmlns:a14="http://schemas.microsoft.com/office/drawing/2010/main" w="9525">
+              <a14:hiddenLine xmlns:a14="http://schemas.microsoft.com/office/drawing/2010/main" xmlns="" w="9525">
                 <a:solidFill>
                   <a:srgbClr val="000000"/>
                 </a:solidFill>
@@ -3236,7 +3240,7 @@
           <a:ln/>
           <a:extLst>
             <a:ext uri="{91240B29-F687-4f45-9708-019B960494DF}">
-              <a14:hiddenLine xmlns="" xmlns:a14="http://schemas.microsoft.com/office/drawing/2010/main" w="9525">
+              <a14:hiddenLine xmlns:a14="http://schemas.microsoft.com/office/drawing/2010/main" xmlns="" w="9525">
                 <a:solidFill>
                   <a:srgbClr val="000000"/>
                 </a:solidFill>
@@ -3710,7 +3714,7 @@
           <a:ln/>
           <a:extLst>
             <a:ext uri="{91240B29-F687-4f45-9708-019B960494DF}">
-              <a14:hiddenLine xmlns="" xmlns:a14="http://schemas.microsoft.com/office/drawing/2010/main" w="9525">
+              <a14:hiddenLine xmlns:a14="http://schemas.microsoft.com/office/drawing/2010/main" xmlns="" w="9525">
                 <a:solidFill>
                   <a:srgbClr val="000000"/>
                 </a:solidFill>
@@ -4133,7 +4137,7 @@
           <a:ln/>
           <a:extLst>
             <a:ext uri="{91240B29-F687-4f45-9708-019B960494DF}">
-              <a14:hiddenLine xmlns="" xmlns:a14="http://schemas.microsoft.com/office/drawing/2010/main" w="9525">
+              <a14:hiddenLine xmlns:a14="http://schemas.microsoft.com/office/drawing/2010/main" xmlns="" w="9525">
                 <a:solidFill>
                   <a:srgbClr val="000000"/>
                 </a:solidFill>
@@ -5455,6 +5459,471 @@
           <a:lstStyle/>
           <a:p>
             <a:r>
+              <a:rPr lang="en-US" dirty="0" smtClean="0">
+                <a:solidFill>
+                  <a:schemeClr val="tx1"/>
+                </a:solidFill>
+              </a:rPr>
+              <a:t>Red</a:t>
+            </a:r>
+            <a:r>
+              <a:rPr lang="en-US" dirty="0" smtClean="0"/>
+              <a:t>/</a:t>
+            </a:r>
+            <a:r>
+              <a:rPr lang="en-US" dirty="0" smtClean="0">
+                <a:solidFill>
+                  <a:schemeClr val="tx1"/>
+                </a:solidFill>
+              </a:rPr>
+              <a:t>Green</a:t>
+            </a:r>
+            <a:r>
+              <a:rPr lang="en-US" dirty="0" smtClean="0"/>
+              <a:t>/</a:t>
+            </a:r>
+            <a:r>
+              <a:rPr lang="en-US" dirty="0" smtClean="0">
+                <a:solidFill>
+                  <a:srgbClr val="0070C0"/>
+                </a:solidFill>
+              </a:rPr>
+              <a:t>Refactor</a:t>
+            </a:r>
+            <a:endParaRPr lang="en-US" dirty="0">
+              <a:solidFill>
+                <a:srgbClr val="0070C0"/>
+              </a:solidFill>
+            </a:endParaRPr>
+          </a:p>
+        </p:txBody>
+      </p:sp>
+      <p:sp>
+        <p:nvSpPr>
+          <p:cNvPr id="2" name="Content Placeholder 1"/>
+          <p:cNvSpPr>
+            <a:spLocks noGrp="1"/>
+          </p:cNvSpPr>
+          <p:nvPr>
+            <p:ph idx="1"/>
+          </p:nvPr>
+        </p:nvSpPr>
+        <p:spPr>
+          <a:xfrm>
+            <a:off x="818712" y="2222287"/>
+            <a:ext cx="10554574" cy="4570399"/>
+          </a:xfrm>
+        </p:spPr>
+        <p:txBody>
+          <a:bodyPr>
+            <a:normAutofit/>
+          </a:bodyPr>
+          <a:lstStyle/>
+          <a:p>
+            <a:r>
+              <a:rPr lang="en-US" dirty="0" smtClean="0"/>
+              <a:t>You can now safely change the code. Look for code smells or other improvements and repeat the cycle until finished.</a:t>
+            </a:r>
+          </a:p>
+        </p:txBody>
+      </p:sp>
+    </p:spTree>
+    <p:extLst>
+      <p:ext uri="{BB962C8B-B14F-4D97-AF65-F5344CB8AC3E}">
+        <p14:creationId xmlns:p14="http://schemas.microsoft.com/office/powerpoint/2010/main" val="3330866362"/>
+      </p:ext>
+    </p:extLst>
+  </p:cSld>
+  <p:clrMapOvr>
+    <a:masterClrMapping/>
+  </p:clrMapOvr>
+  <p:timing>
+    <p:tnLst>
+      <p:par>
+        <p:cTn id="1" dur="indefinite" restart="never" nodeType="tmRoot"/>
+      </p:par>
+    </p:tnLst>
+  </p:timing>
+</p:sld>
+</file>
+
+<file path=ppt/slides/slide11.xml><?xml version="1.0" encoding="utf-8"?>
+<p:sld xmlns:a="http://schemas.openxmlformats.org/drawingml/2006/main" xmlns:r="http://schemas.openxmlformats.org/officeDocument/2006/relationships" xmlns:p="http://schemas.openxmlformats.org/presentationml/2006/main">
+  <p:cSld>
+    <p:spTree>
+      <p:nvGrpSpPr>
+        <p:cNvPr id="1" name=""/>
+        <p:cNvGrpSpPr/>
+        <p:nvPr/>
+      </p:nvGrpSpPr>
+      <p:grpSpPr>
+        <a:xfrm>
+          <a:off x="0" y="0"/>
+          <a:ext cx="0" cy="0"/>
+          <a:chOff x="0" y="0"/>
+          <a:chExt cx="0" cy="0"/>
+        </a:xfrm>
+      </p:grpSpPr>
+      <p:sp>
+        <p:nvSpPr>
+          <p:cNvPr id="4" name="Title 3"/>
+          <p:cNvSpPr>
+            <a:spLocks noGrp="1"/>
+          </p:cNvSpPr>
+          <p:nvPr>
+            <p:ph type="title"/>
+          </p:nvPr>
+        </p:nvSpPr>
+        <p:spPr/>
+        <p:txBody>
+          <a:bodyPr/>
+          <a:lstStyle/>
+          <a:p>
+            <a:r>
+              <a:rPr lang="en-US" dirty="0" smtClean="0"/>
+              <a:t>Next steps…</a:t>
+            </a:r>
+            <a:endParaRPr lang="en-US" dirty="0"/>
+          </a:p>
+        </p:txBody>
+      </p:sp>
+      <p:sp>
+        <p:nvSpPr>
+          <p:cNvPr id="2" name="Content Placeholder 1"/>
+          <p:cNvSpPr>
+            <a:spLocks noGrp="1"/>
+          </p:cNvSpPr>
+          <p:nvPr>
+            <p:ph idx="1"/>
+          </p:nvPr>
+        </p:nvSpPr>
+        <p:spPr>
+          <a:xfrm>
+            <a:off x="818712" y="2222287"/>
+            <a:ext cx="10554574" cy="4570399"/>
+          </a:xfrm>
+        </p:spPr>
+        <p:txBody>
+          <a:bodyPr>
+            <a:normAutofit/>
+          </a:bodyPr>
+          <a:lstStyle/>
+          <a:p>
+            <a:r>
+              <a:rPr lang="en-US" dirty="0" smtClean="0"/>
+              <a:t>Consider various inputs and error conditions. Add additional tests.</a:t>
+            </a:r>
+          </a:p>
+          <a:p>
+            <a:r>
+              <a:rPr lang="en-US" dirty="0" smtClean="0"/>
+              <a:t>Implement the “</a:t>
+            </a:r>
+            <a:r>
+              <a:rPr lang="en-US" dirty="0" err="1" smtClean="0"/>
+              <a:t>deletePost</a:t>
+            </a:r>
+            <a:r>
+              <a:rPr lang="en-US" dirty="0" smtClean="0"/>
+              <a:t>” method in /app/posts/post.directive.js</a:t>
+            </a:r>
+          </a:p>
+          <a:p>
+            <a:r>
+              <a:rPr lang="en-US" dirty="0" smtClean="0"/>
+              <a:t>Add an ng-click </a:t>
+            </a:r>
+            <a:r>
+              <a:rPr lang="en-US" dirty="0" err="1" smtClean="0"/>
+              <a:t>hanlder</a:t>
+            </a:r>
+            <a:r>
+              <a:rPr lang="en-US" dirty="0" smtClean="0"/>
+              <a:t> in the post view.</a:t>
+            </a:r>
+          </a:p>
+          <a:p>
+            <a:r>
+              <a:rPr lang="en-US" dirty="0" smtClean="0"/>
+              <a:t>Add an event handler to the feed</a:t>
+            </a:r>
+            <a:endParaRPr lang="en-US" dirty="0" smtClean="0"/>
+          </a:p>
+        </p:txBody>
+      </p:sp>
+    </p:spTree>
+    <p:extLst>
+      <p:ext uri="{BB962C8B-B14F-4D97-AF65-F5344CB8AC3E}">
+        <p14:creationId xmlns:p14="http://schemas.microsoft.com/office/powerpoint/2010/main" val="1217922105"/>
+      </p:ext>
+    </p:extLst>
+  </p:cSld>
+  <p:clrMapOvr>
+    <a:masterClrMapping/>
+  </p:clrMapOvr>
+  <p:timing>
+    <p:tnLst>
+      <p:par>
+        <p:cTn id="1" dur="indefinite" restart="never" nodeType="tmRoot"/>
+      </p:par>
+    </p:tnLst>
+  </p:timing>
+</p:sld>
+</file>
+
+<file path=ppt/slides/slide12.xml><?xml version="1.0" encoding="utf-8"?>
+<p:sld xmlns:a="http://schemas.openxmlformats.org/drawingml/2006/main" xmlns:r="http://schemas.openxmlformats.org/officeDocument/2006/relationships" xmlns:p="http://schemas.openxmlformats.org/presentationml/2006/main">
+  <p:cSld>
+    <p:spTree>
+      <p:nvGrpSpPr>
+        <p:cNvPr id="1" name=""/>
+        <p:cNvGrpSpPr/>
+        <p:nvPr/>
+      </p:nvGrpSpPr>
+      <p:grpSpPr>
+        <a:xfrm>
+          <a:off x="0" y="0"/>
+          <a:ext cx="0" cy="0"/>
+          <a:chOff x="0" y="0"/>
+          <a:chExt cx="0" cy="0"/>
+        </a:xfrm>
+      </p:grpSpPr>
+      <p:sp>
+        <p:nvSpPr>
+          <p:cNvPr id="4" name="Title 3"/>
+          <p:cNvSpPr>
+            <a:spLocks noGrp="1"/>
+          </p:cNvSpPr>
+          <p:nvPr>
+            <p:ph type="title"/>
+          </p:nvPr>
+        </p:nvSpPr>
+        <p:spPr/>
+        <p:txBody>
+          <a:bodyPr/>
+          <a:lstStyle/>
+          <a:p>
+            <a:r>
+              <a:rPr lang="en-US" dirty="0" smtClean="0"/>
+              <a:t>Breakout</a:t>
+            </a:r>
+            <a:endParaRPr lang="en-US" dirty="0"/>
+          </a:p>
+        </p:txBody>
+      </p:sp>
+    </p:spTree>
+    <p:extLst>
+      <p:ext uri="{BB962C8B-B14F-4D97-AF65-F5344CB8AC3E}">
+        <p14:creationId xmlns:p14="http://schemas.microsoft.com/office/powerpoint/2010/main" val="2609827390"/>
+      </p:ext>
+    </p:extLst>
+  </p:cSld>
+  <p:clrMapOvr>
+    <a:masterClrMapping/>
+  </p:clrMapOvr>
+</p:sld>
+</file>
+
+<file path=ppt/slides/slide13.xml><?xml version="1.0" encoding="utf-8"?>
+<p:sld xmlns:a="http://schemas.openxmlformats.org/drawingml/2006/main" xmlns:r="http://schemas.openxmlformats.org/officeDocument/2006/relationships" xmlns:p="http://schemas.openxmlformats.org/presentationml/2006/main">
+  <p:cSld>
+    <p:spTree>
+      <p:nvGrpSpPr>
+        <p:cNvPr id="1" name=""/>
+        <p:cNvGrpSpPr/>
+        <p:nvPr/>
+      </p:nvGrpSpPr>
+      <p:grpSpPr>
+        <a:xfrm>
+          <a:off x="0" y="0"/>
+          <a:ext cx="0" cy="0"/>
+          <a:chOff x="0" y="0"/>
+          <a:chExt cx="0" cy="0"/>
+        </a:xfrm>
+      </p:grpSpPr>
+      <p:sp>
+        <p:nvSpPr>
+          <p:cNvPr id="4" name="Title 3"/>
+          <p:cNvSpPr>
+            <a:spLocks noGrp="1"/>
+          </p:cNvSpPr>
+          <p:nvPr>
+            <p:ph type="title"/>
+          </p:nvPr>
+        </p:nvSpPr>
+        <p:spPr/>
+        <p:txBody>
+          <a:bodyPr/>
+          <a:lstStyle/>
+          <a:p>
+            <a:r>
+              <a:rPr lang="en-US" dirty="0" smtClean="0"/>
+              <a:t>Your mission…</a:t>
+            </a:r>
+            <a:endParaRPr lang="en-US" dirty="0"/>
+          </a:p>
+        </p:txBody>
+      </p:sp>
+      <p:sp>
+        <p:nvSpPr>
+          <p:cNvPr id="2" name="TextBox 1"/>
+          <p:cNvSpPr txBox="1"/>
+          <p:nvPr/>
+        </p:nvSpPr>
+        <p:spPr>
+          <a:xfrm>
+            <a:off x="1272887" y="3241963"/>
+            <a:ext cx="9646223" cy="2677656"/>
+          </a:xfrm>
+          <a:prstGeom prst="rect">
+            <a:avLst/>
+          </a:prstGeom>
+          <a:noFill/>
+        </p:spPr>
+        <p:txBody>
+          <a:bodyPr wrap="square" rtlCol="0">
+            <a:spAutoFit/>
+          </a:bodyPr>
+          <a:lstStyle/>
+          <a:p>
+            <a:r>
+              <a:rPr lang="en-US" sz="2800" dirty="0" smtClean="0"/>
+              <a:t>As a </a:t>
+            </a:r>
+            <a:r>
+              <a:rPr lang="en-US" sz="2800" dirty="0" err="1" smtClean="0"/>
+              <a:t>sheeper</a:t>
+            </a:r>
+            <a:endParaRPr lang="en-US" sz="2800" dirty="0" smtClean="0"/>
+          </a:p>
+          <a:p>
+            <a:endParaRPr lang="en-US" sz="2800" dirty="0" smtClean="0"/>
+          </a:p>
+          <a:p>
+            <a:r>
+              <a:rPr lang="en-US" sz="2800" dirty="0" smtClean="0"/>
+              <a:t>I want the ability edit </a:t>
+            </a:r>
+            <a:r>
+              <a:rPr lang="en-US" sz="2800" dirty="0" err="1" smtClean="0"/>
+              <a:t>bleets</a:t>
+            </a:r>
+            <a:endParaRPr lang="en-US" sz="2800" dirty="0" smtClean="0"/>
+          </a:p>
+          <a:p>
+            <a:endParaRPr lang="en-US" sz="2800" dirty="0" smtClean="0"/>
+          </a:p>
+          <a:p>
+            <a:r>
+              <a:rPr lang="en-US" sz="2800" dirty="0" smtClean="0"/>
+              <a:t>So that I can change the texts of </a:t>
+            </a:r>
+            <a:r>
+              <a:rPr lang="en-US" sz="2800" dirty="0" err="1" smtClean="0"/>
+              <a:t>bleets</a:t>
+            </a:r>
+            <a:r>
+              <a:rPr lang="en-US" sz="2800" dirty="0" smtClean="0"/>
+              <a:t> when I make mistakes and stuff.</a:t>
+            </a:r>
+            <a:endParaRPr lang="en-US" sz="2800" dirty="0"/>
+          </a:p>
+        </p:txBody>
+      </p:sp>
+      <p:pic>
+        <p:nvPicPr>
+          <p:cNvPr id="6" name="Picture 2" descr="http://www.bleatinghq.com/images/bleat-logo.png"/>
+          <p:cNvPicPr>
+            <a:picLocks noChangeAspect="1" noChangeArrowheads="1"/>
+          </p:cNvPicPr>
+          <p:nvPr/>
+        </p:nvPicPr>
+        <p:blipFill>
+          <a:blip r:embed="rId2">
+            <a:extLst>
+              <a:ext uri="{28A0092B-C50C-407E-A947-70E740481C1C}">
+                <a14:useLocalDpi xmlns:a14="http://schemas.microsoft.com/office/drawing/2010/main" val="0"/>
+              </a:ext>
+            </a:extLst>
+          </a:blip>
+          <a:srcRect/>
+          <a:stretch>
+            <a:fillRect/>
+          </a:stretch>
+        </p:blipFill>
+        <p:spPr bwMode="auto">
+          <a:xfrm>
+            <a:off x="2563775" y="6112786"/>
+            <a:ext cx="3810000" cy="2971801"/>
+          </a:xfrm>
+          <a:prstGeom prst="rect">
+            <a:avLst/>
+          </a:prstGeom>
+          <a:noFill/>
+          <a:extLst>
+            <a:ext uri="{909E8E84-426E-40DD-AFC4-6F175D3DCCD1}">
+              <a14:hiddenFill xmlns:a14="http://schemas.microsoft.com/office/drawing/2010/main">
+                <a:solidFill>
+                  <a:srgbClr val="FFFFFF"/>
+                </a:solidFill>
+              </a14:hiddenFill>
+            </a:ext>
+          </a:extLst>
+        </p:spPr>
+      </p:pic>
+    </p:spTree>
+    <p:extLst>
+      <p:ext uri="{BB962C8B-B14F-4D97-AF65-F5344CB8AC3E}">
+        <p14:creationId xmlns:p14="http://schemas.microsoft.com/office/powerpoint/2010/main" val="2494607478"/>
+      </p:ext>
+    </p:extLst>
+  </p:cSld>
+  <p:clrMapOvr>
+    <a:masterClrMapping/>
+  </p:clrMapOvr>
+  <p:timing>
+    <p:tnLst>
+      <p:par>
+        <p:cTn id="1" dur="indefinite" restart="never" nodeType="tmRoot"/>
+      </p:par>
+    </p:tnLst>
+  </p:timing>
+</p:sld>
+</file>
+
+<file path=ppt/slides/slide14.xml><?xml version="1.0" encoding="utf-8"?>
+<p:sld xmlns:a="http://schemas.openxmlformats.org/drawingml/2006/main" xmlns:r="http://schemas.openxmlformats.org/officeDocument/2006/relationships" xmlns:p="http://schemas.openxmlformats.org/presentationml/2006/main">
+  <p:cSld>
+    <p:spTree>
+      <p:nvGrpSpPr>
+        <p:cNvPr id="1" name=""/>
+        <p:cNvGrpSpPr/>
+        <p:nvPr/>
+      </p:nvGrpSpPr>
+      <p:grpSpPr>
+        <a:xfrm>
+          <a:off x="0" y="0"/>
+          <a:ext cx="0" cy="0"/>
+          <a:chOff x="0" y="0"/>
+          <a:chExt cx="0" cy="0"/>
+        </a:xfrm>
+      </p:grpSpPr>
+      <p:sp>
+        <p:nvSpPr>
+          <p:cNvPr id="4" name="Title 3"/>
+          <p:cNvSpPr>
+            <a:spLocks noGrp="1"/>
+          </p:cNvSpPr>
+          <p:nvPr>
+            <p:ph type="title"/>
+          </p:nvPr>
+        </p:nvSpPr>
+        <p:spPr/>
+        <p:txBody>
+          <a:bodyPr/>
+          <a:lstStyle/>
+          <a:p>
+            <a:r>
               <a:rPr lang="en-US" dirty="0" smtClean="0"/>
               <a:t>Workstation Setup</a:t>
             </a:r>
@@ -5556,7 +6025,7 @@
 </p:sld>
 </file>
 
-<file path=ppt/slides/slide11.xml><?xml version="1.0" encoding="utf-8"?>
+<file path=ppt/slides/slide15.xml><?xml version="1.0" encoding="utf-8"?>
 <p:sld xmlns:a="http://schemas.openxmlformats.org/drawingml/2006/main" xmlns:r="http://schemas.openxmlformats.org/officeDocument/2006/relationships" xmlns:p="http://schemas.openxmlformats.org/presentationml/2006/main">
   <p:cSld>
     <p:spTree>
@@ -5657,7 +6126,7 @@
 </p:sld>
 </file>
 
-<file path=ppt/slides/slide12.xml><?xml version="1.0" encoding="utf-8"?>
+<file path=ppt/slides/slide16.xml><?xml version="1.0" encoding="utf-8"?>
 <p:sld xmlns:a="http://schemas.openxmlformats.org/drawingml/2006/main" xmlns:r="http://schemas.openxmlformats.org/officeDocument/2006/relationships" xmlns:p="http://schemas.openxmlformats.org/presentationml/2006/main">
   <p:cSld>
     <p:spTree>
@@ -5691,11 +6160,7 @@
           <a:p>
             <a:r>
               <a:rPr lang="en-US" dirty="0" smtClean="0"/>
-              <a:t>During the </a:t>
-            </a:r>
-            <a:r>
-              <a:rPr lang="en-US" dirty="0" smtClean="0"/>
-              <a:t>exercise…</a:t>
+              <a:t>During the exercise…</a:t>
             </a:r>
             <a:endParaRPr lang="en-US" dirty="0"/>
           </a:p>
@@ -6093,17 +6558,12 @@
             </a:r>
             <a:r>
               <a:rPr lang="en-US" dirty="0" err="1" smtClean="0"/>
-              <a:t>S</a:t>
-            </a:r>
-            <a:r>
-              <a:rPr lang="en-US" dirty="0" err="1" smtClean="0"/>
-              <a:t>heeper</a:t>
+              <a:t>Sheeper</a:t>
             </a:r>
             <a:r>
               <a:rPr lang="en-US" dirty="0" smtClean="0"/>
               <a:t> architecture and UX.</a:t>
             </a:r>
-            <a:endParaRPr lang="en-US" dirty="0" smtClean="0"/>
           </a:p>
           <a:p>
             <a:r>
@@ -6116,7 +6576,6 @@
               <a:rPr lang="en-US" dirty="0" smtClean="0"/>
               <a:t>Break out into two-person teams and implement another feature – edit.</a:t>
             </a:r>
-            <a:endParaRPr lang="en-US" dirty="0" smtClean="0"/>
           </a:p>
         </p:txBody>
       </p:sp>
@@ -6359,11 +6818,7 @@
             <a:pPr lvl="1"/>
             <a:r>
               <a:rPr lang="en-US" dirty="0" smtClean="0"/>
-              <a:t>User Service – Used to create, edit, delet</a:t>
-            </a:r>
-            <a:r>
-              <a:rPr lang="en-US" dirty="0" smtClean="0"/>
-              <a:t>e </a:t>
+              <a:t>User Service – Used to create, edit, delete </a:t>
             </a:r>
             <a:r>
               <a:rPr lang="en-US" dirty="0" err="1" smtClean="0"/>
@@ -6560,8 +7015,23 @@
           <a:p>
             <a:r>
               <a:rPr lang="en-US" dirty="0" smtClean="0"/>
-              <a:t>Add </a:t>
-            </a:r>
+              <a:t>Let’s start with the </a:t>
+            </a:r>
+            <a:r>
+              <a:rPr lang="en-US" dirty="0" err="1" smtClean="0"/>
+              <a:t>bleet</a:t>
+            </a:r>
+            <a:r>
+              <a:rPr lang="en-US" dirty="0" smtClean="0"/>
+              <a:t> service.</a:t>
+            </a:r>
+          </a:p>
+          <a:p>
+            <a:r>
+              <a:rPr lang="en-US" dirty="0" smtClean="0"/>
+              <a:t>We will do this by adding a test to app\data\bleets.spec.js</a:t>
+            </a:r>
+            <a:endParaRPr lang="en-US" dirty="0" smtClean="0"/>
           </a:p>
         </p:txBody>
       </p:sp>
@@ -6618,23 +7088,97 @@
           <a:lstStyle/>
           <a:p>
             <a:r>
+              <a:rPr lang="en-US" dirty="0" smtClean="0">
+                <a:solidFill>
+                  <a:schemeClr val="accent6">
+                    <a:lumMod val="75000"/>
+                  </a:schemeClr>
+                </a:solidFill>
+              </a:rPr>
+              <a:t>Red</a:t>
+            </a:r>
+            <a:r>
               <a:rPr lang="en-US" dirty="0" smtClean="0"/>
-              <a:t>Breakout</a:t>
-            </a:r>
-            <a:endParaRPr lang="en-US" dirty="0"/>
+              <a:t>/Green/Refactor</a:t>
+            </a:r>
+            <a:endParaRPr lang="en-US" dirty="0"/>
+          </a:p>
+        </p:txBody>
+      </p:sp>
+      <p:sp>
+        <p:nvSpPr>
+          <p:cNvPr id="2" name="Content Placeholder 1"/>
+          <p:cNvSpPr>
+            <a:spLocks noGrp="1"/>
+          </p:cNvSpPr>
+          <p:nvPr>
+            <p:ph idx="1"/>
+          </p:nvPr>
+        </p:nvSpPr>
+        <p:spPr>
+          <a:xfrm>
+            <a:off x="818712" y="2222287"/>
+            <a:ext cx="10554574" cy="4570399"/>
+          </a:xfrm>
+        </p:spPr>
+        <p:txBody>
+          <a:bodyPr>
+            <a:normAutofit/>
+          </a:bodyPr>
+          <a:lstStyle/>
+          <a:p>
+            <a:r>
+              <a:rPr lang="en-US" dirty="0" smtClean="0"/>
+              <a:t>We will start by making a failing test (red) that checks to see if the “</a:t>
+            </a:r>
+            <a:r>
+              <a:rPr lang="en-US" dirty="0" err="1" smtClean="0"/>
+              <a:t>deleteBleet</a:t>
+            </a:r>
+            <a:r>
+              <a:rPr lang="en-US" dirty="0" smtClean="0"/>
+              <a:t>” function calls the right endpoint.</a:t>
+            </a:r>
+          </a:p>
+          <a:p>
+            <a:r>
+              <a:rPr lang="en-US" dirty="0" smtClean="0"/>
+              <a:t>We will use $</a:t>
+            </a:r>
+            <a:r>
+              <a:rPr lang="en-US" dirty="0" err="1" smtClean="0"/>
+              <a:t>httpBackend</a:t>
+            </a:r>
+            <a:r>
+              <a:rPr lang="en-US" dirty="0" smtClean="0"/>
+              <a:t> to help us do this.</a:t>
+            </a:r>
+          </a:p>
+          <a:p>
+            <a:r>
+              <a:rPr lang="en-US" dirty="0" smtClean="0"/>
+              <a:t>You can run the test suite by running the command “gulp test”</a:t>
+            </a:r>
           </a:p>
         </p:txBody>
       </p:sp>
     </p:spTree>
     <p:extLst>
       <p:ext uri="{BB962C8B-B14F-4D97-AF65-F5344CB8AC3E}">
-        <p14:creationId xmlns:p14="http://schemas.microsoft.com/office/powerpoint/2010/main" val="2609827390"/>
+        <p14:creationId xmlns:p14="http://schemas.microsoft.com/office/powerpoint/2010/main" val="201521504"/>
       </p:ext>
     </p:extLst>
   </p:cSld>
   <p:clrMapOvr>
     <a:masterClrMapping/>
   </p:clrMapOvr>
+  <p:timing>
+    <p:tnLst>
+      <p:par>
+        <p:cTn id="1" dur="indefinite" restart="never" nodeType="tmRoot"/>
+      </p:par>
+    </p:tnLst>
+  </p:timing>
 </p:sld>
 </file>
 
@@ -6671,124 +7215,69 @@
           <a:lstStyle/>
           <a:p>
             <a:r>
+              <a:rPr lang="en-US" dirty="0" smtClean="0">
+                <a:solidFill>
+                  <a:schemeClr val="tx1"/>
+                </a:solidFill>
+              </a:rPr>
+              <a:t>Red</a:t>
+            </a:r>
+            <a:r>
               <a:rPr lang="en-US" dirty="0" smtClean="0"/>
-              <a:t>Your mission…</a:t>
-            </a:r>
-            <a:endParaRPr lang="en-US" dirty="0"/>
-          </a:p>
-        </p:txBody>
-      </p:sp>
-      <p:sp>
-        <p:nvSpPr>
-          <p:cNvPr id="2" name="TextBox 1"/>
-          <p:cNvSpPr txBox="1"/>
-          <p:nvPr/>
+              <a:t>/</a:t>
+            </a:r>
+            <a:r>
+              <a:rPr lang="en-US" dirty="0" smtClean="0">
+                <a:solidFill>
+                  <a:schemeClr val="accent3">
+                    <a:lumMod val="75000"/>
+                  </a:schemeClr>
+                </a:solidFill>
+              </a:rPr>
+              <a:t>Green</a:t>
+            </a:r>
+            <a:r>
+              <a:rPr lang="en-US" dirty="0" smtClean="0"/>
+              <a:t>/Refactor</a:t>
+            </a:r>
+            <a:endParaRPr lang="en-US" dirty="0"/>
+          </a:p>
+        </p:txBody>
+      </p:sp>
+      <p:sp>
+        <p:nvSpPr>
+          <p:cNvPr id="2" name="Content Placeholder 1"/>
+          <p:cNvSpPr>
+            <a:spLocks noGrp="1"/>
+          </p:cNvSpPr>
+          <p:nvPr>
+            <p:ph idx="1"/>
+          </p:nvPr>
         </p:nvSpPr>
         <p:spPr>
           <a:xfrm>
-            <a:off x="1272887" y="3241963"/>
-            <a:ext cx="9646223" cy="2677656"/>
+            <a:off x="818712" y="2222287"/>
+            <a:ext cx="10554574" cy="4570399"/>
           </a:xfrm>
-          <a:prstGeom prst="rect">
-            <a:avLst/>
-          </a:prstGeom>
-          <a:noFill/>
         </p:spPr>
         <p:txBody>
-          <a:bodyPr wrap="square" rtlCol="0">
-            <a:spAutoFit/>
+          <a:bodyPr>
+            <a:normAutofit/>
           </a:bodyPr>
           <a:lstStyle/>
           <a:p>
             <a:r>
-              <a:rPr lang="en-US" sz="2800" dirty="0" smtClean="0"/>
-              <a:t>As a </a:t>
-            </a:r>
-            <a:r>
-              <a:rPr lang="en-US" sz="2800" dirty="0" err="1" smtClean="0"/>
-              <a:t>sheeper</a:t>
-            </a:r>
-            <a:endParaRPr lang="en-US" sz="2800" dirty="0" smtClean="0"/>
-          </a:p>
-          <a:p>
-            <a:endParaRPr lang="en-US" sz="2800" dirty="0" smtClean="0"/>
-          </a:p>
-          <a:p>
-            <a:r>
-              <a:rPr lang="en-US" sz="2800" dirty="0" smtClean="0"/>
-              <a:t>I want the ability edit </a:t>
-            </a:r>
-            <a:r>
-              <a:rPr lang="en-US" sz="2800" dirty="0" err="1" smtClean="0"/>
-              <a:t>bleets</a:t>
-            </a:r>
-            <a:endParaRPr lang="en-US" sz="2800" dirty="0" smtClean="0"/>
-          </a:p>
-          <a:p>
-            <a:endParaRPr lang="en-US" sz="2800" dirty="0" smtClean="0"/>
-          </a:p>
-          <a:p>
-            <a:r>
-              <a:rPr lang="en-US" sz="2800" dirty="0" smtClean="0"/>
-              <a:t>So that I can change the texts of </a:t>
-            </a:r>
-            <a:r>
-              <a:rPr lang="en-US" sz="2800" dirty="0" err="1" smtClean="0"/>
-              <a:t>bleets</a:t>
-            </a:r>
-            <a:r>
-              <a:rPr lang="en-US" sz="2800" dirty="0" smtClean="0"/>
-              <a:t> when I make mistakes and stuff.</a:t>
-            </a:r>
-            <a:endParaRPr lang="en-US" sz="2800" dirty="0"/>
-          </a:p>
-        </p:txBody>
-      </p:sp>
-      <p:pic>
-        <p:nvPicPr>
-          <p:cNvPr id="6" name="Picture 2" descr="http://www.bleatinghq.com/images/bleat-logo.png"/>
-          <p:cNvPicPr>
-            <a:picLocks noChangeAspect="1" noChangeArrowheads="1"/>
-          </p:cNvPicPr>
-          <p:nvPr/>
-        </p:nvPicPr>
-        <p:blipFill>
-          <a:blip r:embed="rId2">
-            <a:extLst>
-              <a:ext uri="{28A0092B-C50C-407E-A947-70E740481C1C}">
-                <a14:useLocalDpi xmlns:a14="http://schemas.microsoft.com/office/drawing/2010/main" val="0"/>
-              </a:ext>
-            </a:extLst>
-          </a:blip>
-          <a:srcRect/>
-          <a:stretch>
-            <a:fillRect/>
-          </a:stretch>
-        </p:blipFill>
-        <p:spPr bwMode="auto">
-          <a:xfrm>
-            <a:off x="2563775" y="6112786"/>
-            <a:ext cx="3810000" cy="2971801"/>
-          </a:xfrm>
-          <a:prstGeom prst="rect">
-            <a:avLst/>
-          </a:prstGeom>
-          <a:noFill/>
-          <a:extLst>
-            <a:ext uri="{909E8E84-426E-40DD-AFC4-6F175D3DCCD1}">
-              <a14:hiddenFill xmlns:a14="http://schemas.microsoft.com/office/drawing/2010/main">
-                <a:solidFill>
-                  <a:srgbClr val="FFFFFF"/>
-                </a:solidFill>
-              </a14:hiddenFill>
-            </a:ext>
-          </a:extLst>
-        </p:spPr>
-      </p:pic>
+              <a:rPr lang="en-US" dirty="0" smtClean="0"/>
+              <a:t>Make the test pass.</a:t>
+            </a:r>
+            <a:endParaRPr lang="en-US" dirty="0" smtClean="0"/>
+          </a:p>
+        </p:txBody>
+      </p:sp>
     </p:spTree>
     <p:extLst>
       <p:ext uri="{BB962C8B-B14F-4D97-AF65-F5344CB8AC3E}">
-        <p14:creationId xmlns:p14="http://schemas.microsoft.com/office/powerpoint/2010/main" val="2494607478"/>
+        <p14:creationId xmlns:p14="http://schemas.microsoft.com/office/powerpoint/2010/main" val="1219249696"/>
       </p:ext>
     </p:extLst>
   </p:cSld>

</xml_diff>